<commit_message>
changed to red color + added make feedback
</commit_message>
<xml_diff>
--- a/avatar/avatarsAll.pptx
+++ b/avatar/avatarsAll.pptx
@@ -104,6 +104,11 @@
       </a:defRPr>
     </a:lvl9pPr>
   </p:defaultTextStyle>
+  <p:extLst>
+    <p:ext uri="{EFAFB233-063F-42B5-8137-9DF3F51BA10A}">
+      <p15:sldGuideLst xmlns:p15="http://schemas.microsoft.com/office/powerpoint/2012/main"/>
+    </p:ext>
+  </p:extLst>
 </p:presentation>
 </file>
 
@@ -238,7 +243,7 @@
           <a:p>
             <a:fld id="{42CD9EA7-D072-FD4E-BB59-742E0A680591}" type="datetimeFigureOut">
               <a:rPr lang="en-US" smtClean="0"/>
-              <a:t>10/15/24</a:t>
+              <a:t>1/30/25</a:t>
             </a:fld>
             <a:endParaRPr lang="en-US"/>
           </a:p>
@@ -408,7 +413,7 @@
           <a:p>
             <a:fld id="{42CD9EA7-D072-FD4E-BB59-742E0A680591}" type="datetimeFigureOut">
               <a:rPr lang="en-US" smtClean="0"/>
-              <a:t>10/15/24</a:t>
+              <a:t>1/30/25</a:t>
             </a:fld>
             <a:endParaRPr lang="en-US"/>
           </a:p>
@@ -588,7 +593,7 @@
           <a:p>
             <a:fld id="{42CD9EA7-D072-FD4E-BB59-742E0A680591}" type="datetimeFigureOut">
               <a:rPr lang="en-US" smtClean="0"/>
-              <a:t>10/15/24</a:t>
+              <a:t>1/30/25</a:t>
             </a:fld>
             <a:endParaRPr lang="en-US"/>
           </a:p>
@@ -758,7 +763,7 @@
           <a:p>
             <a:fld id="{42CD9EA7-D072-FD4E-BB59-742E0A680591}" type="datetimeFigureOut">
               <a:rPr lang="en-US" smtClean="0"/>
-              <a:t>10/15/24</a:t>
+              <a:t>1/30/25</a:t>
             </a:fld>
             <a:endParaRPr lang="en-US"/>
           </a:p>
@@ -1004,7 +1009,7 @@
           <a:p>
             <a:fld id="{42CD9EA7-D072-FD4E-BB59-742E0A680591}" type="datetimeFigureOut">
               <a:rPr lang="en-US" smtClean="0"/>
-              <a:t>10/15/24</a:t>
+              <a:t>1/30/25</a:t>
             </a:fld>
             <a:endParaRPr lang="en-US"/>
           </a:p>
@@ -1236,7 +1241,7 @@
           <a:p>
             <a:fld id="{42CD9EA7-D072-FD4E-BB59-742E0A680591}" type="datetimeFigureOut">
               <a:rPr lang="en-US" smtClean="0"/>
-              <a:t>10/15/24</a:t>
+              <a:t>1/30/25</a:t>
             </a:fld>
             <a:endParaRPr lang="en-US"/>
           </a:p>
@@ -1603,7 +1608,7 @@
           <a:p>
             <a:fld id="{42CD9EA7-D072-FD4E-BB59-742E0A680591}" type="datetimeFigureOut">
               <a:rPr lang="en-US" smtClean="0"/>
-              <a:t>10/15/24</a:t>
+              <a:t>1/30/25</a:t>
             </a:fld>
             <a:endParaRPr lang="en-US"/>
           </a:p>
@@ -1721,7 +1726,7 @@
           <a:p>
             <a:fld id="{42CD9EA7-D072-FD4E-BB59-742E0A680591}" type="datetimeFigureOut">
               <a:rPr lang="en-US" smtClean="0"/>
-              <a:t>10/15/24</a:t>
+              <a:t>1/30/25</a:t>
             </a:fld>
             <a:endParaRPr lang="en-US"/>
           </a:p>
@@ -1816,7 +1821,7 @@
           <a:p>
             <a:fld id="{42CD9EA7-D072-FD4E-BB59-742E0A680591}" type="datetimeFigureOut">
               <a:rPr lang="en-US" smtClean="0"/>
-              <a:t>10/15/24</a:t>
+              <a:t>1/30/25</a:t>
             </a:fld>
             <a:endParaRPr lang="en-US"/>
           </a:p>
@@ -2093,7 +2098,7 @@
           <a:p>
             <a:fld id="{42CD9EA7-D072-FD4E-BB59-742E0A680591}" type="datetimeFigureOut">
               <a:rPr lang="en-US" smtClean="0"/>
-              <a:t>10/15/24</a:t>
+              <a:t>1/30/25</a:t>
             </a:fld>
             <a:endParaRPr lang="en-US"/>
           </a:p>
@@ -2350,7 +2355,7 @@
           <a:p>
             <a:fld id="{42CD9EA7-D072-FD4E-BB59-742E0A680591}" type="datetimeFigureOut">
               <a:rPr lang="en-US" smtClean="0"/>
-              <a:t>10/15/24</a:t>
+              <a:t>1/30/25</a:t>
             </a:fld>
             <a:endParaRPr lang="en-US"/>
           </a:p>
@@ -2563,7 +2568,7 @@
           <a:p>
             <a:fld id="{42CD9EA7-D072-FD4E-BB59-742E0A680591}" type="datetimeFigureOut">
               <a:rPr lang="en-US" smtClean="0"/>
-              <a:t>10/15/24</a:t>
+              <a:t>1/30/25</a:t>
             </a:fld>
             <a:endParaRPr lang="en-US"/>
           </a:p>
@@ -3020,7 +3025,7 @@
         </p:blipFill>
         <p:spPr>
           <a:xfrm>
-            <a:off x="4274337" y="401863"/>
+            <a:off x="4240569" y="401863"/>
             <a:ext cx="3985500" cy="4225471"/>
           </a:xfrm>
           <a:prstGeom prst="rect">
@@ -3030,10 +3035,10 @@
       </p:pic>
       <p:pic>
         <p:nvPicPr>
-          <p:cNvPr id="8" name="Picture 7">
+          <p:cNvPr id="3" name="Picture 2">
             <a:extLst>
               <a:ext uri="{FF2B5EF4-FFF2-40B4-BE49-F238E27FC236}">
-                <a16:creationId xmlns:a16="http://schemas.microsoft.com/office/drawing/2014/main" id="{D22B1B09-3476-B36B-8107-ED5426426E45}"/>
+                <a16:creationId xmlns:a16="http://schemas.microsoft.com/office/drawing/2014/main" id="{9D5F0C00-7D34-D548-2A56-5307E53C22F5}"/>
               </a:ext>
             </a:extLst>
           </p:cNvPr>
@@ -3050,8 +3055,8 @@
         </p:blipFill>
         <p:spPr>
           <a:xfrm>
-            <a:off x="8471375" y="401864"/>
-            <a:ext cx="3995262" cy="4225471"/>
+            <a:off x="8473855" y="402806"/>
+            <a:ext cx="3989084" cy="4224528"/>
           </a:xfrm>
           <a:prstGeom prst="rect">
             <a:avLst/>

</xml_diff>

<commit_message>
changed color of avatar and of solo
</commit_message>
<xml_diff>
--- a/avatar/avatarsAll.pptx
+++ b/avatar/avatarsAll.pptx
@@ -243,7 +243,7 @@
           <a:p>
             <a:fld id="{42CD9EA7-D072-FD4E-BB59-742E0A680591}" type="datetimeFigureOut">
               <a:rPr lang="en-US" smtClean="0"/>
-              <a:t>1/30/25</a:t>
+              <a:t>2/4/25</a:t>
             </a:fld>
             <a:endParaRPr lang="en-US"/>
           </a:p>
@@ -413,7 +413,7 @@
           <a:p>
             <a:fld id="{42CD9EA7-D072-FD4E-BB59-742E0A680591}" type="datetimeFigureOut">
               <a:rPr lang="en-US" smtClean="0"/>
-              <a:t>1/30/25</a:t>
+              <a:t>2/4/25</a:t>
             </a:fld>
             <a:endParaRPr lang="en-US"/>
           </a:p>
@@ -593,7 +593,7 @@
           <a:p>
             <a:fld id="{42CD9EA7-D072-FD4E-BB59-742E0A680591}" type="datetimeFigureOut">
               <a:rPr lang="en-US" smtClean="0"/>
-              <a:t>1/30/25</a:t>
+              <a:t>2/4/25</a:t>
             </a:fld>
             <a:endParaRPr lang="en-US"/>
           </a:p>
@@ -763,7 +763,7 @@
           <a:p>
             <a:fld id="{42CD9EA7-D072-FD4E-BB59-742E0A680591}" type="datetimeFigureOut">
               <a:rPr lang="en-US" smtClean="0"/>
-              <a:t>1/30/25</a:t>
+              <a:t>2/4/25</a:t>
             </a:fld>
             <a:endParaRPr lang="en-US"/>
           </a:p>
@@ -1009,7 +1009,7 @@
           <a:p>
             <a:fld id="{42CD9EA7-D072-FD4E-BB59-742E0A680591}" type="datetimeFigureOut">
               <a:rPr lang="en-US" smtClean="0"/>
-              <a:t>1/30/25</a:t>
+              <a:t>2/4/25</a:t>
             </a:fld>
             <a:endParaRPr lang="en-US"/>
           </a:p>
@@ -1241,7 +1241,7 @@
           <a:p>
             <a:fld id="{42CD9EA7-D072-FD4E-BB59-742E0A680591}" type="datetimeFigureOut">
               <a:rPr lang="en-US" smtClean="0"/>
-              <a:t>1/30/25</a:t>
+              <a:t>2/4/25</a:t>
             </a:fld>
             <a:endParaRPr lang="en-US"/>
           </a:p>
@@ -1608,7 +1608,7 @@
           <a:p>
             <a:fld id="{42CD9EA7-D072-FD4E-BB59-742E0A680591}" type="datetimeFigureOut">
               <a:rPr lang="en-US" smtClean="0"/>
-              <a:t>1/30/25</a:t>
+              <a:t>2/4/25</a:t>
             </a:fld>
             <a:endParaRPr lang="en-US"/>
           </a:p>
@@ -1726,7 +1726,7 @@
           <a:p>
             <a:fld id="{42CD9EA7-D072-FD4E-BB59-742E0A680591}" type="datetimeFigureOut">
               <a:rPr lang="en-US" smtClean="0"/>
-              <a:t>1/30/25</a:t>
+              <a:t>2/4/25</a:t>
             </a:fld>
             <a:endParaRPr lang="en-US"/>
           </a:p>
@@ -1821,7 +1821,7 @@
           <a:p>
             <a:fld id="{42CD9EA7-D072-FD4E-BB59-742E0A680591}" type="datetimeFigureOut">
               <a:rPr lang="en-US" smtClean="0"/>
-              <a:t>1/30/25</a:t>
+              <a:t>2/4/25</a:t>
             </a:fld>
             <a:endParaRPr lang="en-US"/>
           </a:p>
@@ -2098,7 +2098,7 @@
           <a:p>
             <a:fld id="{42CD9EA7-D072-FD4E-BB59-742E0A680591}" type="datetimeFigureOut">
               <a:rPr lang="en-US" smtClean="0"/>
-              <a:t>1/30/25</a:t>
+              <a:t>2/4/25</a:t>
             </a:fld>
             <a:endParaRPr lang="en-US"/>
           </a:p>
@@ -2355,7 +2355,7 @@
           <a:p>
             <a:fld id="{42CD9EA7-D072-FD4E-BB59-742E0A680591}" type="datetimeFigureOut">
               <a:rPr lang="en-US" smtClean="0"/>
-              <a:t>1/30/25</a:t>
+              <a:t>2/4/25</a:t>
             </a:fld>
             <a:endParaRPr lang="en-US"/>
           </a:p>
@@ -2568,7 +2568,7 @@
           <a:p>
             <a:fld id="{42CD9EA7-D072-FD4E-BB59-742E0A680591}" type="datetimeFigureOut">
               <a:rPr lang="en-US" smtClean="0"/>
-              <a:t>1/30/25</a:t>
+              <a:t>2/4/25</a:t>
             </a:fld>
             <a:endParaRPr lang="en-US"/>
           </a:p>
@@ -2975,36 +2975,6 @@
       </p:grpSpPr>
       <p:pic>
         <p:nvPicPr>
-          <p:cNvPr id="5" name="Picture 4">
-            <a:extLst>
-              <a:ext uri="{FF2B5EF4-FFF2-40B4-BE49-F238E27FC236}">
-                <a16:creationId xmlns:a16="http://schemas.microsoft.com/office/drawing/2014/main" id="{55EEC29E-B192-784C-10FF-B40871A783B3}"/>
-              </a:ext>
-            </a:extLst>
-          </p:cNvPr>
-          <p:cNvPicPr>
-            <a:picLocks noChangeAspect="1"/>
-          </p:cNvPicPr>
-          <p:nvPr/>
-        </p:nvPicPr>
-        <p:blipFill>
-          <a:blip r:embed="rId2"/>
-          <a:stretch>
-            <a:fillRect/>
-          </a:stretch>
-        </p:blipFill>
-        <p:spPr>
-          <a:xfrm>
-            <a:off x="0" y="401864"/>
-            <a:ext cx="3992785" cy="4225471"/>
-          </a:xfrm>
-          <a:prstGeom prst="rect">
-            <a:avLst/>
-          </a:prstGeom>
-        </p:spPr>
-      </p:pic>
-      <p:pic>
-        <p:nvPicPr>
           <p:cNvPr id="7" name="Picture 6">
             <a:extLst>
               <a:ext uri="{FF2B5EF4-FFF2-40B4-BE49-F238E27FC236}">
@@ -3018,7 +2988,7 @@
           <p:nvPr/>
         </p:nvPicPr>
         <p:blipFill>
-          <a:blip r:embed="rId3"/>
+          <a:blip r:embed="rId2"/>
           <a:stretch>
             <a:fillRect/>
           </a:stretch>
@@ -3048,6 +3018,36 @@
           <p:nvPr/>
         </p:nvPicPr>
         <p:blipFill>
+          <a:blip r:embed="rId3"/>
+          <a:stretch>
+            <a:fillRect/>
+          </a:stretch>
+        </p:blipFill>
+        <p:spPr>
+          <a:xfrm>
+            <a:off x="8473855" y="402806"/>
+            <a:ext cx="3989084" cy="4224528"/>
+          </a:xfrm>
+          <a:prstGeom prst="rect">
+            <a:avLst/>
+          </a:prstGeom>
+        </p:spPr>
+      </p:pic>
+      <p:pic>
+        <p:nvPicPr>
+          <p:cNvPr id="2" name="Picture 1">
+            <a:extLst>
+              <a:ext uri="{FF2B5EF4-FFF2-40B4-BE49-F238E27FC236}">
+                <a16:creationId xmlns:a16="http://schemas.microsoft.com/office/drawing/2014/main" id="{F93DC0E2-1977-6268-8EBE-0F631535F070}"/>
+              </a:ext>
+            </a:extLst>
+          </p:cNvPr>
+          <p:cNvPicPr>
+            <a:picLocks noChangeAspect="1"/>
+          </p:cNvPicPr>
+          <p:nvPr/>
+        </p:nvPicPr>
+        <p:blipFill>
           <a:blip r:embed="rId4"/>
           <a:stretch>
             <a:fillRect/>
@@ -3055,7 +3055,7 @@
         </p:blipFill>
         <p:spPr>
           <a:xfrm>
-            <a:off x="8473855" y="402806"/>
+            <a:off x="0" y="402806"/>
             <a:ext cx="3989084" cy="4224528"/>
           </a:xfrm>
           <a:prstGeom prst="rect">

</xml_diff>